<commit_message>
completed data mining evaluation of classiciation techniques
</commit_message>
<xml_diff>
--- a/CSC535presentation.pptx
+++ b/CSC535presentation.pptx
@@ -1276,7 +1276,7 @@
         </p:nvSpPr>
         <p:spPr>
           <a:xfrm>
-            <a:off x="381300" y="685800"/>
+            <a:off x="381000" y="685800"/>
             <a:ext cx="6096000" cy="3429000"/>
           </a:xfrm>
           <a:custGeom>
@@ -11094,7 +11094,7 @@
               </a:spcAft>
               <a:buNone/>
             </a:pPr>
-            <a:endParaRPr>
+            <a:endParaRPr dirty="0">
               <a:solidFill>
                 <a:srgbClr val="FFFFFF"/>
               </a:solidFill>
@@ -11114,7 +11114,7 @@
               </a:spcAft>
               <a:buNone/>
             </a:pPr>
-            <a:endParaRPr>
+            <a:endParaRPr dirty="0">
               <a:solidFill>
                 <a:srgbClr val="FFFFFF"/>
               </a:solidFill>
@@ -11135,7 +11135,7 @@
               <a:buNone/>
             </a:pPr>
             <a:r>
-              <a:rPr lang="en">
+              <a:rPr lang="en" dirty="0">
                 <a:solidFill>
                   <a:srgbClr val="FFFFFF"/>
                 </a:solidFill>
@@ -11146,7 +11146,7 @@
               </a:rPr>
               <a:t>Here is the distribution </a:t>
             </a:r>
-            <a:endParaRPr>
+            <a:endParaRPr dirty="0">
               <a:solidFill>
                 <a:srgbClr val="FFFFFF"/>
               </a:solidFill>
@@ -11167,7 +11167,7 @@
               <a:buNone/>
             </a:pPr>
             <a:r>
-              <a:rPr lang="en">
+              <a:rPr lang="en" dirty="0">
                 <a:solidFill>
                   <a:srgbClr val="FFFFFF"/>
                 </a:solidFill>
@@ -11178,7 +11178,7 @@
               </a:rPr>
               <a:t>of class outcomes</a:t>
             </a:r>
-            <a:endParaRPr>
+            <a:endParaRPr dirty="0">
               <a:solidFill>
                 <a:srgbClr val="FFFFFF"/>
               </a:solidFill>
@@ -11198,7 +11198,7 @@
               </a:spcAft>
               <a:buNone/>
             </a:pPr>
-            <a:endParaRPr>
+            <a:endParaRPr dirty="0">
               <a:solidFill>
                 <a:srgbClr val="FFFFFF"/>
               </a:solidFill>
@@ -11219,7 +11219,7 @@
               <a:buNone/>
             </a:pPr>
             <a:r>
-              <a:rPr lang="en">
+              <a:rPr lang="en" dirty="0">
                 <a:solidFill>
                   <a:srgbClr val="FFFFFF"/>
                 </a:solidFill>
@@ -11230,7 +11230,7 @@
               </a:rPr>
               <a:t>3 to 1 difference</a:t>
             </a:r>
-            <a:endParaRPr>
+            <a:endParaRPr dirty="0">
               <a:solidFill>
                 <a:srgbClr val="FFFFFF"/>
               </a:solidFill>
@@ -11251,7 +11251,7 @@
               <a:buNone/>
             </a:pPr>
             <a:r>
-              <a:rPr lang="en">
+              <a:rPr lang="en" dirty="0">
                 <a:solidFill>
                   <a:srgbClr val="FFFFFF"/>
                 </a:solidFill>
@@ -11262,7 +11262,7 @@
               </a:rPr>
               <a:t>570 to 178 to be exact</a:t>
             </a:r>
-            <a:endParaRPr>
+            <a:endParaRPr dirty="0">
               <a:solidFill>
                 <a:srgbClr val="FFFFFF"/>
               </a:solidFill>
@@ -11282,7 +11282,7 @@
               </a:spcAft>
               <a:buNone/>
             </a:pPr>
-            <a:endParaRPr>
+            <a:endParaRPr dirty="0">
               <a:solidFill>
                 <a:srgbClr val="FFFFFF"/>
               </a:solidFill>
@@ -11303,7 +11303,7 @@
               <a:buNone/>
             </a:pPr>
             <a:r>
-              <a:rPr lang="en">
+              <a:rPr lang="en" dirty="0">
                 <a:solidFill>
                   <a:srgbClr val="FFFFFF"/>
                 </a:solidFill>
@@ -11312,9 +11312,9 @@
                 <a:cs typeface="Lato"/>
                 <a:sym typeface="Lato"/>
               </a:rPr>
-              <a:t>Is this unbalanced?</a:t>
+              <a:t>Is this imbalanced?</a:t>
             </a:r>
-            <a:endParaRPr>
+            <a:endParaRPr dirty="0">
               <a:solidFill>
                 <a:srgbClr val="FFFFFF"/>
               </a:solidFill>
@@ -11342,7 +11342,7 @@
         </p:blipFill>
         <p:spPr>
           <a:xfrm>
-            <a:off x="2606600" y="655000"/>
+            <a:off x="2606600" y="666575"/>
             <a:ext cx="6537400" cy="4264075"/>
           </a:xfrm>
           <a:prstGeom prst="rect">

</xml_diff>